<commit_message>
oppdatert word og ny excel
</commit_message>
<xml_diff>
--- a/Pilot2_organisering av prosjektteamet.pptx
+++ b/Pilot2_organisering av prosjektteamet.pptx
@@ -3163,7 +3163,7 @@
           <a:p>
             <a:fld id="{F52D2517-354E-45E0-A500-9BBCE3F9F131}" type="datetimeFigureOut">
               <a:rPr lang="nb-NO" smtClean="0"/>
-              <a:t>05.08.2021</a:t>
+              <a:t>09.08.2021</a:t>
             </a:fld>
             <a:endParaRPr lang="nb-NO"/>
           </a:p>
@@ -3363,7 +3363,7 @@
           <a:p>
             <a:fld id="{F52D2517-354E-45E0-A500-9BBCE3F9F131}" type="datetimeFigureOut">
               <a:rPr lang="nb-NO" smtClean="0"/>
-              <a:t>05.08.2021</a:t>
+              <a:t>09.08.2021</a:t>
             </a:fld>
             <a:endParaRPr lang="nb-NO"/>
           </a:p>
@@ -3573,7 +3573,7 @@
           <a:p>
             <a:fld id="{F52D2517-354E-45E0-A500-9BBCE3F9F131}" type="datetimeFigureOut">
               <a:rPr lang="nb-NO" smtClean="0"/>
-              <a:t>05.08.2021</a:t>
+              <a:t>09.08.2021</a:t>
             </a:fld>
             <a:endParaRPr lang="nb-NO"/>
           </a:p>
@@ -3773,7 +3773,7 @@
           <a:p>
             <a:fld id="{F52D2517-354E-45E0-A500-9BBCE3F9F131}" type="datetimeFigureOut">
               <a:rPr lang="nb-NO" smtClean="0"/>
-              <a:t>05.08.2021</a:t>
+              <a:t>09.08.2021</a:t>
             </a:fld>
             <a:endParaRPr lang="nb-NO"/>
           </a:p>
@@ -4049,7 +4049,7 @@
           <a:p>
             <a:fld id="{F52D2517-354E-45E0-A500-9BBCE3F9F131}" type="datetimeFigureOut">
               <a:rPr lang="nb-NO" smtClean="0"/>
-              <a:t>05.08.2021</a:t>
+              <a:t>09.08.2021</a:t>
             </a:fld>
             <a:endParaRPr lang="nb-NO"/>
           </a:p>
@@ -4317,7 +4317,7 @@
           <a:p>
             <a:fld id="{F52D2517-354E-45E0-A500-9BBCE3F9F131}" type="datetimeFigureOut">
               <a:rPr lang="nb-NO" smtClean="0"/>
-              <a:t>05.08.2021</a:t>
+              <a:t>09.08.2021</a:t>
             </a:fld>
             <a:endParaRPr lang="nb-NO"/>
           </a:p>
@@ -4732,7 +4732,7 @@
           <a:p>
             <a:fld id="{F52D2517-354E-45E0-A500-9BBCE3F9F131}" type="datetimeFigureOut">
               <a:rPr lang="nb-NO" smtClean="0"/>
-              <a:t>05.08.2021</a:t>
+              <a:t>09.08.2021</a:t>
             </a:fld>
             <a:endParaRPr lang="nb-NO"/>
           </a:p>
@@ -4874,7 +4874,7 @@
           <a:p>
             <a:fld id="{F52D2517-354E-45E0-A500-9BBCE3F9F131}" type="datetimeFigureOut">
               <a:rPr lang="nb-NO" smtClean="0"/>
-              <a:t>05.08.2021</a:t>
+              <a:t>09.08.2021</a:t>
             </a:fld>
             <a:endParaRPr lang="nb-NO"/>
           </a:p>
@@ -4987,7 +4987,7 @@
           <a:p>
             <a:fld id="{F52D2517-354E-45E0-A500-9BBCE3F9F131}" type="datetimeFigureOut">
               <a:rPr lang="nb-NO" smtClean="0"/>
-              <a:t>05.08.2021</a:t>
+              <a:t>09.08.2021</a:t>
             </a:fld>
             <a:endParaRPr lang="nb-NO"/>
           </a:p>
@@ -5300,7 +5300,7 @@
           <a:p>
             <a:fld id="{F52D2517-354E-45E0-A500-9BBCE3F9F131}" type="datetimeFigureOut">
               <a:rPr lang="nb-NO" smtClean="0"/>
-              <a:t>05.08.2021</a:t>
+              <a:t>09.08.2021</a:t>
             </a:fld>
             <a:endParaRPr lang="nb-NO"/>
           </a:p>
@@ -5589,7 +5589,7 @@
           <a:p>
             <a:fld id="{F52D2517-354E-45E0-A500-9BBCE3F9F131}" type="datetimeFigureOut">
               <a:rPr lang="nb-NO" smtClean="0"/>
-              <a:t>05.08.2021</a:t>
+              <a:t>09.08.2021</a:t>
             </a:fld>
             <a:endParaRPr lang="nb-NO"/>
           </a:p>
@@ -5832,7 +5832,7 @@
           <a:p>
             <a:fld id="{F52D2517-354E-45E0-A500-9BBCE3F9F131}" type="datetimeFigureOut">
               <a:rPr lang="nb-NO" smtClean="0"/>
-              <a:t>05.08.2021</a:t>
+              <a:t>09.08.2021</a:t>
             </a:fld>
             <a:endParaRPr lang="nb-NO"/>
           </a:p>
@@ -6282,28 +6282,7 @@
           </a:bodyPr>
           <a:lstStyle/>
           <a:p>
-            <a:r>
-              <a:rPr lang="nb-NO" sz="1400" dirty="0"/>
-              <a:t>1 student</a:t>
-            </a:r>
-          </a:p>
-          <a:p>
-            <a:r>
-              <a:rPr lang="nb-NO" sz="1400" dirty="0"/>
-              <a:t>1 Fagressurs</a:t>
-            </a:r>
-          </a:p>
-          <a:p>
-            <a:r>
-              <a:rPr lang="nb-NO" sz="1400" dirty="0"/>
-              <a:t>(1 Ekstern samarbeidspartner)</a:t>
-            </a:r>
-          </a:p>
-          <a:p>
-            <a:r>
-              <a:rPr lang="nb-NO" sz="1400" dirty="0"/>
-              <a:t>1 professor</a:t>
-            </a:r>
+            <a:endParaRPr lang="nb-NO" sz="1400" dirty="0"/>
           </a:p>
           <a:p>
             <a:r>
@@ -6316,16 +6295,28 @@
             </a:r>
             <a:r>
               <a:rPr lang="nb-NO" sz="1400" dirty="0"/>
-              <a:t> Hansen </a:t>
-            </a:r>
-            <a:r>
-              <a:rPr lang="nb-NO" sz="1400"/>
-              <a:t>(Universitetslektor</a:t>
-            </a:r>
+              <a:t> Hansen (Universitetslektor)</a:t>
+            </a:r>
+          </a:p>
+          <a:p>
             <a:r>
               <a:rPr lang="nb-NO" sz="1400" dirty="0"/>
-              <a:t>)</a:t>
-            </a:r>
+              <a:t>Daniel Amin </a:t>
+            </a:r>
+            <a:r>
+              <a:rPr lang="nb-NO" sz="1400" dirty="0" err="1"/>
+              <a:t>Haddadi</a:t>
+            </a:r>
+            <a:r>
+              <a:rPr lang="nb-NO" sz="1400" dirty="0"/>
+              <a:t> (Prosjektleder)</a:t>
+            </a:r>
+          </a:p>
+          <a:p>
+            <a:endParaRPr lang="nb-NO" sz="1400" dirty="0"/>
+          </a:p>
+          <a:p>
+            <a:endParaRPr lang="nb-NO" sz="1400" dirty="0"/>
           </a:p>
           <a:p>
             <a:endParaRPr lang="nb-NO" sz="1400" dirty="0"/>
@@ -6378,16 +6369,6 @@
                 <a:effectLst/>
                 <a:ea typeface="Calibri" panose="020F0502020204030204" pitchFamily="34" charset="0"/>
               </a:rPr>
-              <a:t>Hallgrim Hjelmbrekke (Instituttleder)</a:t>
-            </a:r>
-          </a:p>
-          <a:p>
-            <a:pPr algn="r"/>
-            <a:r>
-              <a:rPr lang="nb-NO" sz="1400" dirty="0">
-                <a:effectLst/>
-                <a:ea typeface="Calibri" panose="020F0502020204030204" pitchFamily="34" charset="0"/>
-              </a:rPr>
               <a:t>Sigbjørn Derås (Overingeniør)</a:t>
             </a:r>
           </a:p>
@@ -6413,6 +6394,9 @@
               </a:rPr>
               <a:t>Christian Nordahl Rolfsen (Universitetslektor)</a:t>
             </a:r>
+          </a:p>
+          <a:p>
+            <a:pPr algn="r"/>
             <a:endParaRPr lang="nb-NO" sz="1400" dirty="0"/>
           </a:p>
           <a:p>
@@ -6435,7 +6419,7 @@
         </p:nvSpPr>
         <p:spPr>
           <a:xfrm>
-            <a:off x="4398257" y="2259449"/>
+            <a:off x="4426537" y="2233056"/>
             <a:ext cx="5922415" cy="1384995"/>
           </a:xfrm>
           <a:prstGeom prst="rect">
@@ -6857,21 +6841,6 @@
 </file>
 
 <file path=customXml/item1.xml><?xml version="1.0" encoding="utf-8"?>
-<p:properties xmlns:p="http://schemas.microsoft.com/office/2006/metadata/properties" xmlns:xsi="http://www.w3.org/2001/XMLSchema-instance" xmlns:pc="http://schemas.microsoft.com/office/infopath/2007/PartnerControls">
-  <documentManagement/>
-</p:properties>
-</file>
-
-<file path=customXml/item2.xml><?xml version="1.0" encoding="utf-8"?>
-<?mso-contentType ?>
-<FormTemplates xmlns="http://schemas.microsoft.com/sharepoint/v3/contenttype/forms">
-  <Display>DocumentLibraryForm</Display>
-  <Edit>DocumentLibraryForm</Edit>
-  <New>DocumentLibraryForm</New>
-</FormTemplates>
-</file>
-
-<file path=customXml/item3.xml><?xml version="1.0" encoding="utf-8"?>
 <ct:contentTypeSchema xmlns:ct="http://schemas.microsoft.com/office/2006/metadata/contentType" xmlns:ma="http://schemas.microsoft.com/office/2006/metadata/properties/metaAttributes" ct:_="" ma:_="" ma:contentTypeName="Dokument" ma:contentTypeID="0x0101006CC7DBF175EDDB4CB62795E217BC6B28" ma:contentTypeVersion="5" ma:contentTypeDescription="Opprett et nytt dokument." ma:contentTypeScope="" ma:versionID="8cc2e1cd8ed5e3d06dd91de90409297d">
   <xsd:schema xmlns:xsd="http://www.w3.org/2001/XMLSchema" xmlns:xs="http://www.w3.org/2001/XMLSchema" xmlns:p="http://schemas.microsoft.com/office/2006/metadata/properties" xmlns:ns3="b657e3ff-2373-44ab-b220-4a34d78146a3" targetNamespace="http://schemas.microsoft.com/office/2006/metadata/properties" ma:root="true" ma:fieldsID="98c485b3c75fa18eb6466c28261613cc" ns3:_="">
     <xsd:import namespace="b657e3ff-2373-44ab-b220-4a34d78146a3"/>
@@ -7021,31 +6990,22 @@
 </ct:contentTypeSchema>
 </file>
 
-<file path=customXml/itemProps1.xml><?xml version="1.0" encoding="utf-8"?>
-<ds:datastoreItem xmlns:ds="http://schemas.openxmlformats.org/officeDocument/2006/customXml" ds:itemID="{37CE55D0-9F44-409C-8891-66A0126536B1}">
-  <ds:schemaRefs>
-    <ds:schemaRef ds:uri="http://schemas.microsoft.com/office/2006/documentManagement/types"/>
-    <ds:schemaRef ds:uri="http://schemas.microsoft.com/office/infopath/2007/PartnerControls"/>
-    <ds:schemaRef ds:uri="http://purl.org/dc/elements/1.1/"/>
-    <ds:schemaRef ds:uri="http://purl.org/dc/dcmitype/"/>
-    <ds:schemaRef ds:uri="http://schemas.microsoft.com/office/2006/metadata/properties"/>
-    <ds:schemaRef ds:uri="http://www.w3.org/XML/1998/namespace"/>
-    <ds:schemaRef ds:uri="http://purl.org/dc/terms/"/>
-    <ds:schemaRef ds:uri="http://schemas.openxmlformats.org/package/2006/metadata/core-properties"/>
-    <ds:schemaRef ds:uri="b657e3ff-2373-44ab-b220-4a34d78146a3"/>
-  </ds:schemaRefs>
-</ds:datastoreItem>
+<file path=customXml/item2.xml><?xml version="1.0" encoding="utf-8"?>
+<?mso-contentType ?>
+<FormTemplates xmlns="http://schemas.microsoft.com/sharepoint/v3/contenttype/forms">
+  <Display>DocumentLibraryForm</Display>
+  <Edit>DocumentLibraryForm</Edit>
+  <New>DocumentLibraryForm</New>
+</FormTemplates>
 </file>
 
-<file path=customXml/itemProps2.xml><?xml version="1.0" encoding="utf-8"?>
-<ds:datastoreItem xmlns:ds="http://schemas.openxmlformats.org/officeDocument/2006/customXml" ds:itemID="{8176C55A-C0F1-42B5-8B82-E5EF1F8186E9}">
-  <ds:schemaRefs>
-    <ds:schemaRef ds:uri="http://schemas.microsoft.com/sharepoint/v3/contenttype/forms"/>
-  </ds:schemaRefs>
-</ds:datastoreItem>
+<file path=customXml/item3.xml><?xml version="1.0" encoding="utf-8"?>
+<p:properties xmlns:p="http://schemas.microsoft.com/office/2006/metadata/properties" xmlns:xsi="http://www.w3.org/2001/XMLSchema-instance" xmlns:pc="http://schemas.microsoft.com/office/infopath/2007/PartnerControls">
+  <documentManagement/>
+</p:properties>
 </file>
 
-<file path=customXml/itemProps3.xml><?xml version="1.0" encoding="utf-8"?>
+<file path=customXml/itemProps1.xml><?xml version="1.0" encoding="utf-8"?>
 <ds:datastoreItem xmlns:ds="http://schemas.openxmlformats.org/officeDocument/2006/customXml" ds:itemID="{36D7BAC2-8C10-4D23-A51F-ADA19DC01A6A}">
   <ds:schemaRefs>
     <ds:schemaRef ds:uri="http://schemas.microsoft.com/office/2006/metadata/contentType"/>
@@ -7061,4 +7021,28 @@
     <ds:schemaRef ds:uri="http://schemas.microsoft.com/internal/obd"/>
   </ds:schemaRefs>
 </ds:datastoreItem>
+</file>
+
+<file path=customXml/itemProps2.xml><?xml version="1.0" encoding="utf-8"?>
+<ds:datastoreItem xmlns:ds="http://schemas.openxmlformats.org/officeDocument/2006/customXml" ds:itemID="{8176C55A-C0F1-42B5-8B82-E5EF1F8186E9}">
+  <ds:schemaRefs>
+    <ds:schemaRef ds:uri="http://schemas.microsoft.com/sharepoint/v3/contenttype/forms"/>
+  </ds:schemaRefs>
+</ds:datastoreItem>
+</file>
+
+<file path=customXml/itemProps3.xml><?xml version="1.0" encoding="utf-8"?>
+<ds:datastoreItem xmlns:ds="http://schemas.openxmlformats.org/officeDocument/2006/customXml" ds:itemID="{37CE55D0-9F44-409C-8891-66A0126536B1}">
+  <ds:schemaRefs>
+    <ds:schemaRef ds:uri="http://schemas.microsoft.com/office/2006/documentManagement/types"/>
+    <ds:schemaRef ds:uri="http://schemas.microsoft.com/office/infopath/2007/PartnerControls"/>
+    <ds:schemaRef ds:uri="http://purl.org/dc/elements/1.1/"/>
+    <ds:schemaRef ds:uri="http://purl.org/dc/dcmitype/"/>
+    <ds:schemaRef ds:uri="http://schemas.microsoft.com/office/2006/metadata/properties"/>
+    <ds:schemaRef ds:uri="http://www.w3.org/XML/1998/namespace"/>
+    <ds:schemaRef ds:uri="http://purl.org/dc/terms/"/>
+    <ds:schemaRef ds:uri="http://schemas.openxmlformats.org/package/2006/metadata/core-properties"/>
+    <ds:schemaRef ds:uri="b657e3ff-2373-44ab-b220-4a34d78146a3"/>
+  </ds:schemaRefs>
+</ds:datastoreItem>
 </file>
</xml_diff>